<commit_message>
finish week 3 reading
</commit_message>
<xml_diff>
--- a/Assignments/ZB-Week3-Readings.pptx
+++ b/Assignments/ZB-Week3-Readings.pptx
@@ -8,8 +8,16 @@
     <p:sldId id="256" r:id="rId2"/>
     <p:sldId id="257" r:id="rId3"/>
     <p:sldId id="258" r:id="rId4"/>
-    <p:sldId id="259" r:id="rId5"/>
-    <p:sldId id="260" r:id="rId6"/>
+    <p:sldId id="261" r:id="rId5"/>
+    <p:sldId id="262" r:id="rId6"/>
+    <p:sldId id="263" r:id="rId7"/>
+    <p:sldId id="264" r:id="rId8"/>
+    <p:sldId id="265" r:id="rId9"/>
+    <p:sldId id="259" r:id="rId10"/>
+    <p:sldId id="260" r:id="rId11"/>
+    <p:sldId id="266" r:id="rId12"/>
+    <p:sldId id="267" r:id="rId13"/>
+    <p:sldId id="268" r:id="rId14"/>
   </p:sldIdLst>
   <p:sldSz cx="12192000" cy="6858000"/>
   <p:notesSz cx="6858000" cy="9144000"/>
@@ -263,7 +271,7 @@
           <a:p>
             <a:fld id="{8ADC7208-6DBE-8040-89DF-57A489FA4BEC}" type="datetimeFigureOut">
               <a:rPr lang="en-US" smtClean="0"/>
-              <a:t>1/25/2024</a:t>
+              <a:t>1/31/24</a:t>
             </a:fld>
             <a:endParaRPr lang="en-US"/>
           </a:p>
@@ -461,7 +469,7 @@
           <a:p>
             <a:fld id="{8ADC7208-6DBE-8040-89DF-57A489FA4BEC}" type="datetimeFigureOut">
               <a:rPr lang="en-US" smtClean="0"/>
-              <a:t>1/25/2024</a:t>
+              <a:t>1/31/24</a:t>
             </a:fld>
             <a:endParaRPr lang="en-US"/>
           </a:p>
@@ -669,7 +677,7 @@
           <a:p>
             <a:fld id="{8ADC7208-6DBE-8040-89DF-57A489FA4BEC}" type="datetimeFigureOut">
               <a:rPr lang="en-US" smtClean="0"/>
-              <a:t>1/25/2024</a:t>
+              <a:t>1/31/24</a:t>
             </a:fld>
             <a:endParaRPr lang="en-US"/>
           </a:p>
@@ -867,7 +875,7 @@
           <a:p>
             <a:fld id="{8ADC7208-6DBE-8040-89DF-57A489FA4BEC}" type="datetimeFigureOut">
               <a:rPr lang="en-US" smtClean="0"/>
-              <a:t>1/25/2024</a:t>
+              <a:t>1/31/24</a:t>
             </a:fld>
             <a:endParaRPr lang="en-US"/>
           </a:p>
@@ -1142,7 +1150,7 @@
           <a:p>
             <a:fld id="{8ADC7208-6DBE-8040-89DF-57A489FA4BEC}" type="datetimeFigureOut">
               <a:rPr lang="en-US" smtClean="0"/>
-              <a:t>1/25/2024</a:t>
+              <a:t>1/31/24</a:t>
             </a:fld>
             <a:endParaRPr lang="en-US"/>
           </a:p>
@@ -1407,7 +1415,7 @@
           <a:p>
             <a:fld id="{8ADC7208-6DBE-8040-89DF-57A489FA4BEC}" type="datetimeFigureOut">
               <a:rPr lang="en-US" smtClean="0"/>
-              <a:t>1/25/2024</a:t>
+              <a:t>1/31/24</a:t>
             </a:fld>
             <a:endParaRPr lang="en-US"/>
           </a:p>
@@ -1819,7 +1827,7 @@
           <a:p>
             <a:fld id="{8ADC7208-6DBE-8040-89DF-57A489FA4BEC}" type="datetimeFigureOut">
               <a:rPr lang="en-US" smtClean="0"/>
-              <a:t>1/25/2024</a:t>
+              <a:t>1/31/24</a:t>
             </a:fld>
             <a:endParaRPr lang="en-US"/>
           </a:p>
@@ -1960,7 +1968,7 @@
           <a:p>
             <a:fld id="{8ADC7208-6DBE-8040-89DF-57A489FA4BEC}" type="datetimeFigureOut">
               <a:rPr lang="en-US" smtClean="0"/>
-              <a:t>1/25/2024</a:t>
+              <a:t>1/31/24</a:t>
             </a:fld>
             <a:endParaRPr lang="en-US"/>
           </a:p>
@@ -2073,7 +2081,7 @@
           <a:p>
             <a:fld id="{8ADC7208-6DBE-8040-89DF-57A489FA4BEC}" type="datetimeFigureOut">
               <a:rPr lang="en-US" smtClean="0"/>
-              <a:t>1/25/2024</a:t>
+              <a:t>1/31/24</a:t>
             </a:fld>
             <a:endParaRPr lang="en-US"/>
           </a:p>
@@ -2384,7 +2392,7 @@
           <a:p>
             <a:fld id="{8ADC7208-6DBE-8040-89DF-57A489FA4BEC}" type="datetimeFigureOut">
               <a:rPr lang="en-US" smtClean="0"/>
-              <a:t>1/25/2024</a:t>
+              <a:t>1/31/24</a:t>
             </a:fld>
             <a:endParaRPr lang="en-US"/>
           </a:p>
@@ -2672,7 +2680,7 @@
           <a:p>
             <a:fld id="{8ADC7208-6DBE-8040-89DF-57A489FA4BEC}" type="datetimeFigureOut">
               <a:rPr lang="en-US" smtClean="0"/>
-              <a:t>1/25/2024</a:t>
+              <a:t>1/31/24</a:t>
             </a:fld>
             <a:endParaRPr lang="en-US"/>
           </a:p>
@@ -2913,7 +2921,7 @@
           <a:p>
             <a:fld id="{8ADC7208-6DBE-8040-89DF-57A489FA4BEC}" type="datetimeFigureOut">
               <a:rPr lang="en-US" smtClean="0"/>
-              <a:t>1/25/2024</a:t>
+              <a:t>1/31/24</a:t>
             </a:fld>
             <a:endParaRPr lang="en-US"/>
           </a:p>
@@ -3396,6 +3404,467 @@
 </p:sld>
 </file>
 
+<file path=ppt/slides/slide10.xml><?xml version="1.0" encoding="utf-8"?>
+<p:sld xmlns:a="http://schemas.openxmlformats.org/drawingml/2006/main" xmlns:r="http://schemas.openxmlformats.org/officeDocument/2006/relationships" xmlns:p="http://schemas.openxmlformats.org/presentationml/2006/main">
+  <p:cSld>
+    <p:spTree>
+      <p:nvGrpSpPr>
+        <p:cNvPr id="1" name=""/>
+        <p:cNvGrpSpPr/>
+        <p:nvPr/>
+      </p:nvGrpSpPr>
+      <p:grpSpPr>
+        <a:xfrm>
+          <a:off x="0" y="0"/>
+          <a:ext cx="0" cy="0"/>
+          <a:chOff x="0" y="0"/>
+          <a:chExt cx="0" cy="0"/>
+        </a:xfrm>
+      </p:grpSpPr>
+      <p:sp>
+        <p:nvSpPr>
+          <p:cNvPr id="2" name="Title 1">
+            <a:extLst>
+              <a:ext uri="{FF2B5EF4-FFF2-40B4-BE49-F238E27FC236}">
+                <a16:creationId xmlns:a16="http://schemas.microsoft.com/office/drawing/2014/main" id="{41AC4731-21D5-C08E-9A2D-C8B4F7AB1CC2}"/>
+              </a:ext>
+            </a:extLst>
+          </p:cNvPr>
+          <p:cNvSpPr>
+            <a:spLocks noGrp="1"/>
+          </p:cNvSpPr>
+          <p:nvPr>
+            <p:ph type="title"/>
+          </p:nvPr>
+        </p:nvSpPr>
+        <p:spPr/>
+        <p:txBody>
+          <a:bodyPr/>
+          <a:lstStyle/>
+          <a:p>
+            <a:r>
+              <a:rPr lang="en-US" dirty="0"/>
+              <a:t>Jargon </a:t>
+            </a:r>
+          </a:p>
+        </p:txBody>
+      </p:sp>
+      <p:sp>
+        <p:nvSpPr>
+          <p:cNvPr id="3" name="Content Placeholder 2">
+            <a:extLst>
+              <a:ext uri="{FF2B5EF4-FFF2-40B4-BE49-F238E27FC236}">
+                <a16:creationId xmlns:a16="http://schemas.microsoft.com/office/drawing/2014/main" id="{21F2247D-FF82-6C00-CEDA-A9DA20702883}"/>
+              </a:ext>
+            </a:extLst>
+          </p:cNvPr>
+          <p:cNvSpPr>
+            <a:spLocks noGrp="1"/>
+          </p:cNvSpPr>
+          <p:nvPr>
+            <p:ph idx="1"/>
+          </p:nvPr>
+        </p:nvSpPr>
+        <p:spPr/>
+        <p:txBody>
+          <a:bodyPr>
+            <a:normAutofit/>
+          </a:bodyPr>
+          <a:lstStyle/>
+          <a:p>
+            <a:r>
+              <a:rPr lang="en-US" dirty="0"/>
+              <a:t>Mutation: localized alternation of a nucleic acid residue.</a:t>
+            </a:r>
+          </a:p>
+          <a:p>
+            <a:r>
+              <a:rPr lang="en-US" dirty="0"/>
+              <a:t>Residue: a single unit of a polymer.</a:t>
+            </a:r>
+          </a:p>
+          <a:p>
+            <a:r>
+              <a:rPr lang="en-US" dirty="0"/>
+              <a:t>Silent or synonymous mutation: those that do not give rise to an amino acid substitution despite being located in a protein-coding region of the genome (change one codon to another codon that encodes the same amino acid).</a:t>
+            </a:r>
+          </a:p>
+          <a:p>
+            <a:r>
+              <a:rPr lang="en-US" dirty="0"/>
+              <a:t>Neutral theory: evolution of organisms at the molecular level occurs mainly due to random drift.</a:t>
+            </a:r>
+          </a:p>
+        </p:txBody>
+      </p:sp>
+    </p:spTree>
+    <p:extLst>
+      <p:ext uri="{BB962C8B-B14F-4D97-AF65-F5344CB8AC3E}">
+        <p14:creationId xmlns:p14="http://schemas.microsoft.com/office/powerpoint/2010/main" val="196150771"/>
+      </p:ext>
+    </p:extLst>
+  </p:cSld>
+  <p:clrMapOvr>
+    <a:masterClrMapping/>
+  </p:clrMapOvr>
+</p:sld>
+</file>
+
+<file path=ppt/slides/slide11.xml><?xml version="1.0" encoding="utf-8"?>
+<p:sld xmlns:a="http://schemas.openxmlformats.org/drawingml/2006/main" xmlns:r="http://schemas.openxmlformats.org/officeDocument/2006/relationships" xmlns:p="http://schemas.openxmlformats.org/presentationml/2006/main">
+  <p:cSld>
+    <p:spTree>
+      <p:nvGrpSpPr>
+        <p:cNvPr id="1" name=""/>
+        <p:cNvGrpSpPr/>
+        <p:nvPr/>
+      </p:nvGrpSpPr>
+      <p:grpSpPr>
+        <a:xfrm>
+          <a:off x="0" y="0"/>
+          <a:ext cx="0" cy="0"/>
+          <a:chOff x="0" y="0"/>
+          <a:chExt cx="0" cy="0"/>
+        </a:xfrm>
+      </p:grpSpPr>
+      <p:sp>
+        <p:nvSpPr>
+          <p:cNvPr id="2" name="Title 1">
+            <a:extLst>
+              <a:ext uri="{FF2B5EF4-FFF2-40B4-BE49-F238E27FC236}">
+                <a16:creationId xmlns:a16="http://schemas.microsoft.com/office/drawing/2014/main" id="{59E12B34-01DA-BBE9-F74D-731E1FDA41A6}"/>
+              </a:ext>
+            </a:extLst>
+          </p:cNvPr>
+          <p:cNvSpPr>
+            <a:spLocks noGrp="1"/>
+          </p:cNvSpPr>
+          <p:nvPr>
+            <p:ph type="title"/>
+          </p:nvPr>
+        </p:nvSpPr>
+        <p:spPr/>
+        <p:txBody>
+          <a:bodyPr/>
+          <a:lstStyle/>
+          <a:p>
+            <a:r>
+              <a:rPr lang="en-US" dirty="0"/>
+              <a:t>Jargon</a:t>
+            </a:r>
+          </a:p>
+        </p:txBody>
+      </p:sp>
+      <p:sp>
+        <p:nvSpPr>
+          <p:cNvPr id="3" name="Content Placeholder 2">
+            <a:extLst>
+              <a:ext uri="{FF2B5EF4-FFF2-40B4-BE49-F238E27FC236}">
+                <a16:creationId xmlns:a16="http://schemas.microsoft.com/office/drawing/2014/main" id="{D83C20C6-4B1E-0E26-DD5F-2182BDA8E09D}"/>
+              </a:ext>
+            </a:extLst>
+          </p:cNvPr>
+          <p:cNvSpPr>
+            <a:spLocks noGrp="1"/>
+          </p:cNvSpPr>
+          <p:nvPr>
+            <p:ph idx="1"/>
+          </p:nvPr>
+        </p:nvSpPr>
+        <p:spPr/>
+        <p:txBody>
+          <a:bodyPr>
+            <a:normAutofit fontScale="92500" lnSpcReduction="20000"/>
+          </a:bodyPr>
+          <a:lstStyle/>
+          <a:p>
+            <a:r>
+              <a:rPr lang="en-US" dirty="0"/>
+              <a:t>Episodic positive selection: transient events of positive (directional) selection due to one or a few AA substitutions in a string of synonymous, tolerated mutations.</a:t>
+            </a:r>
+          </a:p>
+          <a:p>
+            <a:r>
+              <a:rPr lang="en-US" dirty="0"/>
+              <a:t>Internal oligoadenylate tract: a bunch of </a:t>
+            </a:r>
+            <a:r>
+              <a:rPr lang="en-US" dirty="0" err="1"/>
+              <a:t>adenoside</a:t>
+            </a:r>
+            <a:r>
+              <a:rPr lang="en-US" dirty="0"/>
+              <a:t> nucleotides that are not at the end of a polynucleotide (as oppose to a poly-A tail).</a:t>
+            </a:r>
+          </a:p>
+          <a:p>
+            <a:r>
+              <a:rPr lang="en-US" dirty="0" err="1"/>
+              <a:t>Homopolymeric</a:t>
+            </a:r>
+            <a:r>
+              <a:rPr lang="en-US" dirty="0"/>
+              <a:t> tract: part of a polymer with different types of units which is all composed of the same unit.</a:t>
+            </a:r>
+          </a:p>
+          <a:p>
+            <a:r>
+              <a:rPr lang="en-US" dirty="0"/>
+              <a:t>Polymerase slippage: when there are too many repeats of the same base, the polymerase can slide off the template and stop copying or mess something up.</a:t>
+            </a:r>
+          </a:p>
+          <a:p>
+            <a:r>
+              <a:rPr lang="en-US" dirty="0"/>
+              <a:t>Exonuclease activity: enzymatic activity that allows a protein to cleave individual residues off of a nucleic acid polymer.</a:t>
+            </a:r>
+          </a:p>
+        </p:txBody>
+      </p:sp>
+    </p:spTree>
+    <p:extLst>
+      <p:ext uri="{BB962C8B-B14F-4D97-AF65-F5344CB8AC3E}">
+        <p14:creationId xmlns:p14="http://schemas.microsoft.com/office/powerpoint/2010/main" val="2569963960"/>
+      </p:ext>
+    </p:extLst>
+  </p:cSld>
+  <p:clrMapOvr>
+    <a:masterClrMapping/>
+  </p:clrMapOvr>
+</p:sld>
+</file>
+
+<file path=ppt/slides/slide12.xml><?xml version="1.0" encoding="utf-8"?>
+<p:sld xmlns:a="http://schemas.openxmlformats.org/drawingml/2006/main" xmlns:r="http://schemas.openxmlformats.org/officeDocument/2006/relationships" xmlns:p="http://schemas.openxmlformats.org/presentationml/2006/main">
+  <p:cSld>
+    <p:spTree>
+      <p:nvGrpSpPr>
+        <p:cNvPr id="1" name=""/>
+        <p:cNvGrpSpPr/>
+        <p:nvPr/>
+      </p:nvGrpSpPr>
+      <p:grpSpPr>
+        <a:xfrm>
+          <a:off x="0" y="0"/>
+          <a:ext cx="0" cy="0"/>
+          <a:chOff x="0" y="0"/>
+          <a:chExt cx="0" cy="0"/>
+        </a:xfrm>
+      </p:grpSpPr>
+      <p:sp>
+        <p:nvSpPr>
+          <p:cNvPr id="2" name="Title 1">
+            <a:extLst>
+              <a:ext uri="{FF2B5EF4-FFF2-40B4-BE49-F238E27FC236}">
+                <a16:creationId xmlns:a16="http://schemas.microsoft.com/office/drawing/2014/main" id="{03A0B4E1-3F30-11DC-CE43-B97196C05A30}"/>
+              </a:ext>
+            </a:extLst>
+          </p:cNvPr>
+          <p:cNvSpPr>
+            <a:spLocks noGrp="1"/>
+          </p:cNvSpPr>
+          <p:nvPr>
+            <p:ph type="title"/>
+          </p:nvPr>
+        </p:nvSpPr>
+        <p:spPr/>
+        <p:txBody>
+          <a:bodyPr/>
+          <a:lstStyle/>
+          <a:p>
+            <a:r>
+              <a:rPr lang="en-US" dirty="0"/>
+              <a:t>Jargon</a:t>
+            </a:r>
+          </a:p>
+        </p:txBody>
+      </p:sp>
+      <p:sp>
+        <p:nvSpPr>
+          <p:cNvPr id="3" name="Content Placeholder 2">
+            <a:extLst>
+              <a:ext uri="{FF2B5EF4-FFF2-40B4-BE49-F238E27FC236}">
+                <a16:creationId xmlns:a16="http://schemas.microsoft.com/office/drawing/2014/main" id="{B3189959-F3BF-0F18-C0C4-44CF7F7562AF}"/>
+              </a:ext>
+            </a:extLst>
+          </p:cNvPr>
+          <p:cNvSpPr>
+            <a:spLocks noGrp="1"/>
+          </p:cNvSpPr>
+          <p:nvPr>
+            <p:ph idx="1"/>
+          </p:nvPr>
+        </p:nvSpPr>
+        <p:spPr/>
+        <p:txBody>
+          <a:bodyPr>
+            <a:normAutofit fontScale="92500"/>
+          </a:bodyPr>
+          <a:lstStyle/>
+          <a:p>
+            <a:r>
+              <a:rPr lang="en-US" dirty="0"/>
+              <a:t>RNA replicases: aka RDRP, binds to a SSRNA strand and synthesizes its complementary strand (as opposed to DDRP for transcription).</a:t>
+            </a:r>
+          </a:p>
+          <a:p>
+            <a:r>
+              <a:rPr lang="en-US" dirty="0"/>
+              <a:t>Moiety: a part of a molecule.</a:t>
+            </a:r>
+          </a:p>
+          <a:p>
+            <a:r>
+              <a:rPr lang="en-US" dirty="0"/>
+              <a:t>APOBEC: apolipoprotein B mRNA editing complex; a protein complex which mutates RNA transcripts.</a:t>
+            </a:r>
+          </a:p>
+          <a:p>
+            <a:r>
+              <a:rPr lang="en-US" dirty="0"/>
+              <a:t>ADAR: adenosine deaminase acting on ds-RNA; same thing but different.</a:t>
+            </a:r>
+          </a:p>
+          <a:p>
+            <a:r>
+              <a:rPr lang="en-US" dirty="0" err="1"/>
+              <a:t>Reversegenetics</a:t>
+            </a:r>
+            <a:r>
+              <a:rPr lang="en-US" dirty="0"/>
+              <a:t>: method for studying genetics where a gene is altered to examine the consequences on the phenotype.</a:t>
+            </a:r>
+          </a:p>
+          <a:p>
+            <a:r>
+              <a:rPr lang="en-US" dirty="0"/>
+              <a:t>Compensatory mutation: beneficial mutations which allow other deleterious mutations to remain in the genome.</a:t>
+            </a:r>
+          </a:p>
+          <a:p>
+            <a:endParaRPr lang="en-US" dirty="0"/>
+          </a:p>
+        </p:txBody>
+      </p:sp>
+    </p:spTree>
+    <p:extLst>
+      <p:ext uri="{BB962C8B-B14F-4D97-AF65-F5344CB8AC3E}">
+        <p14:creationId xmlns:p14="http://schemas.microsoft.com/office/powerpoint/2010/main" val="981520427"/>
+      </p:ext>
+    </p:extLst>
+  </p:cSld>
+  <p:clrMapOvr>
+    <a:masterClrMapping/>
+  </p:clrMapOvr>
+</p:sld>
+</file>
+
+<file path=ppt/slides/slide13.xml><?xml version="1.0" encoding="utf-8"?>
+<p:sld xmlns:a="http://schemas.openxmlformats.org/drawingml/2006/main" xmlns:r="http://schemas.openxmlformats.org/officeDocument/2006/relationships" xmlns:p="http://schemas.openxmlformats.org/presentationml/2006/main">
+  <p:cSld>
+    <p:spTree>
+      <p:nvGrpSpPr>
+        <p:cNvPr id="1" name=""/>
+        <p:cNvGrpSpPr/>
+        <p:nvPr/>
+      </p:nvGrpSpPr>
+      <p:grpSpPr>
+        <a:xfrm>
+          <a:off x="0" y="0"/>
+          <a:ext cx="0" cy="0"/>
+          <a:chOff x="0" y="0"/>
+          <a:chExt cx="0" cy="0"/>
+        </a:xfrm>
+      </p:grpSpPr>
+      <p:sp>
+        <p:nvSpPr>
+          <p:cNvPr id="2" name="Title 1">
+            <a:extLst>
+              <a:ext uri="{FF2B5EF4-FFF2-40B4-BE49-F238E27FC236}">
+                <a16:creationId xmlns:a16="http://schemas.microsoft.com/office/drawing/2014/main" id="{80D7E62A-B22E-336B-9AB5-E6423372E3DA}"/>
+              </a:ext>
+            </a:extLst>
+          </p:cNvPr>
+          <p:cNvSpPr>
+            <a:spLocks noGrp="1"/>
+          </p:cNvSpPr>
+          <p:nvPr>
+            <p:ph type="title"/>
+          </p:nvPr>
+        </p:nvSpPr>
+        <p:spPr/>
+        <p:txBody>
+          <a:bodyPr/>
+          <a:lstStyle/>
+          <a:p>
+            <a:r>
+              <a:rPr lang="en-US" dirty="0"/>
+              <a:t>Jargon</a:t>
+            </a:r>
+          </a:p>
+        </p:txBody>
+      </p:sp>
+      <p:sp>
+        <p:nvSpPr>
+          <p:cNvPr id="3" name="Content Placeholder 2">
+            <a:extLst>
+              <a:ext uri="{FF2B5EF4-FFF2-40B4-BE49-F238E27FC236}">
+                <a16:creationId xmlns:a16="http://schemas.microsoft.com/office/drawing/2014/main" id="{5AFDFE51-0DEC-7BE2-F8C8-C0EF92E8105D}"/>
+              </a:ext>
+            </a:extLst>
+          </p:cNvPr>
+          <p:cNvSpPr>
+            <a:spLocks noGrp="1"/>
+          </p:cNvSpPr>
+          <p:nvPr>
+            <p:ph idx="1"/>
+          </p:nvPr>
+        </p:nvSpPr>
+        <p:spPr/>
+        <p:txBody>
+          <a:bodyPr>
+            <a:normAutofit lnSpcReduction="10000"/>
+          </a:bodyPr>
+          <a:lstStyle/>
+          <a:p>
+            <a:r>
+              <a:rPr lang="en-US" dirty="0"/>
+              <a:t>Epistasis: the joint effect of different mutations in the same genome on the same trait.</a:t>
+            </a:r>
+          </a:p>
+          <a:p>
+            <a:r>
+              <a:rPr lang="en-US" dirty="0"/>
+              <a:t>Recombination: the formation of a new genome by covalent linkage of genetic material from multiple parent genomes.</a:t>
+            </a:r>
+          </a:p>
+          <a:p>
+            <a:r>
+              <a:rPr lang="en-US" dirty="0"/>
+              <a:t>Defective interfering (DI) genomes: virus particles that contain only part of the genome and thus interfere in the normal replicative cycle by generally being in the way.</a:t>
+            </a:r>
+          </a:p>
+          <a:p>
+            <a:r>
+              <a:rPr lang="en-US" dirty="0"/>
+              <a:t>Multipartite virus: a virus with a segmented genome where each viral particle only contains part of the total genome; a cell must be coinfected by all parts of the genome simultaneously to produce new virus.</a:t>
+            </a:r>
+          </a:p>
+        </p:txBody>
+      </p:sp>
+    </p:spTree>
+    <p:extLst>
+      <p:ext uri="{BB962C8B-B14F-4D97-AF65-F5344CB8AC3E}">
+        <p14:creationId xmlns:p14="http://schemas.microsoft.com/office/powerpoint/2010/main" val="2155003811"/>
+      </p:ext>
+    </p:extLst>
+  </p:cSld>
+  <p:clrMapOvr>
+    <a:masterClrMapping/>
+  </p:clrMapOvr>
+</p:sld>
+</file>
+
 <file path=ppt/slides/slide2.xml><?xml version="1.0" encoding="utf-8"?>
 <p:sld xmlns:a="http://schemas.openxmlformats.org/drawingml/2006/main" xmlns:r="http://schemas.openxmlformats.org/officeDocument/2006/relationships" xmlns:p="http://schemas.openxmlformats.org/presentationml/2006/main">
   <p:cSld>
@@ -3593,7 +4062,28 @@
           </a:bodyPr>
           <a:lstStyle/>
           <a:p>
-            <a:endParaRPr lang="en-US" dirty="0"/>
+            <a:r>
+              <a:rPr lang="en-US" dirty="0"/>
+              <a:t>Mechanisms for generating genetic diversity act independently of selective pressure.</a:t>
+            </a:r>
+          </a:p>
+          <a:p>
+            <a:r>
+              <a:rPr lang="en-US" dirty="0"/>
+              <a:t>Defective genomic variants can perform relevant biological roles on a population level.</a:t>
+            </a:r>
+          </a:p>
+          <a:p>
+            <a:r>
+              <a:rPr lang="en-US" dirty="0"/>
+              <a:t>Mutation occurs when the wrong nucleotide is inserted in copy, and is primarily driven by the electronic structure of nucleic acid bases.</a:t>
+            </a:r>
+          </a:p>
+          <a:p>
+            <a:r>
+              <a:rPr lang="en-US" dirty="0"/>
+              <a:t>Hydrogen bonding is the primary force holding DNA strands together, and the strength of bonding determines whether a double-stranded polynucleotide will be formed.</a:t>
+            </a:r>
           </a:p>
         </p:txBody>
       </p:sp>
@@ -3632,7 +4122,7 @@
           <p:cNvPr id="2" name="Title 1">
             <a:extLst>
               <a:ext uri="{FF2B5EF4-FFF2-40B4-BE49-F238E27FC236}">
-                <a16:creationId xmlns:a16="http://schemas.microsoft.com/office/drawing/2014/main" id="{BA7B9142-092A-EBE2-510D-57BE0819B9A8}"/>
+                <a16:creationId xmlns:a16="http://schemas.microsoft.com/office/drawing/2014/main" id="{580E79A6-3DFB-11DF-14BD-976F1B3FF0D1}"/>
               </a:ext>
             </a:extLst>
           </p:cNvPr>
@@ -3650,7 +4140,7 @@
           <a:p>
             <a:r>
               <a:rPr lang="en-US" dirty="0"/>
-              <a:t>Questions</a:t>
+              <a:t>Key Findings/Recommendations</a:t>
             </a:r>
           </a:p>
         </p:txBody>
@@ -3660,7 +4150,7 @@
           <p:cNvPr id="3" name="Content Placeholder 2">
             <a:extLst>
               <a:ext uri="{FF2B5EF4-FFF2-40B4-BE49-F238E27FC236}">
-                <a16:creationId xmlns:a16="http://schemas.microsoft.com/office/drawing/2014/main" id="{3E05A46C-995E-49C3-968F-699FBF3D423F}"/>
+                <a16:creationId xmlns:a16="http://schemas.microsoft.com/office/drawing/2014/main" id="{55187FB3-B855-33E6-8E0A-0B97D1329209}"/>
               </a:ext>
             </a:extLst>
           </p:cNvPr>
@@ -3678,14 +4168,35 @@
           </a:bodyPr>
           <a:lstStyle/>
           <a:p>
-            <a:endParaRPr lang="en-US" dirty="0"/>
+            <a:r>
+              <a:rPr lang="en-US" dirty="0"/>
+              <a:t>Silent/synonymous mutations still alter the electronic structure of a polynucleotide, which can lead to non-neutral effects of silent mutations.</a:t>
+            </a:r>
+          </a:p>
+          <a:p>
+            <a:r>
+              <a:rPr lang="en-US" dirty="0"/>
+              <a:t>Multiple types of mutations cause alterations to genetic material, including point mutations, indels, and transition (e.g. slippage).</a:t>
+            </a:r>
+          </a:p>
+          <a:p>
+            <a:r>
+              <a:rPr lang="en-US" dirty="0"/>
+              <a:t>Mutagenesis is highly unpredictable, introducing stochasticity into the evolution of genomes.</a:t>
+            </a:r>
+          </a:p>
+          <a:p>
+            <a:r>
+              <a:rPr lang="en-US" dirty="0"/>
+              <a:t>Synonymous mutations may alter the replication rate of a virus when a mutation corresponds to a less abundant tRNA in the host environment.</a:t>
+            </a:r>
           </a:p>
         </p:txBody>
       </p:sp>
     </p:spTree>
     <p:extLst>
       <p:ext uri="{BB962C8B-B14F-4D97-AF65-F5344CB8AC3E}">
-        <p14:creationId xmlns:p14="http://schemas.microsoft.com/office/powerpoint/2010/main" val="3438904725"/>
+        <p14:creationId xmlns:p14="http://schemas.microsoft.com/office/powerpoint/2010/main" val="1555827996"/>
       </p:ext>
     </p:extLst>
   </p:cSld>
@@ -3717,7 +4228,7 @@
           <p:cNvPr id="2" name="Title 1">
             <a:extLst>
               <a:ext uri="{FF2B5EF4-FFF2-40B4-BE49-F238E27FC236}">
-                <a16:creationId xmlns:a16="http://schemas.microsoft.com/office/drawing/2014/main" id="{41AC4731-21D5-C08E-9A2D-C8B4F7AB1CC2}"/>
+                <a16:creationId xmlns:a16="http://schemas.microsoft.com/office/drawing/2014/main" id="{580E79A6-3DFB-11DF-14BD-976F1B3FF0D1}"/>
               </a:ext>
             </a:extLst>
           </p:cNvPr>
@@ -3735,7 +4246,7 @@
           <a:p>
             <a:r>
               <a:rPr lang="en-US" dirty="0"/>
-              <a:t>Jargon </a:t>
+              <a:t>Key Findings/Recommendations</a:t>
             </a:r>
           </a:p>
         </p:txBody>
@@ -3745,7 +4256,7 @@
           <p:cNvPr id="3" name="Content Placeholder 2">
             <a:extLst>
               <a:ext uri="{FF2B5EF4-FFF2-40B4-BE49-F238E27FC236}">
-                <a16:creationId xmlns:a16="http://schemas.microsoft.com/office/drawing/2014/main" id="{21F2247D-FF82-6C00-CEDA-A9DA20702883}"/>
+                <a16:creationId xmlns:a16="http://schemas.microsoft.com/office/drawing/2014/main" id="{55187FB3-B855-33E6-8E0A-0B97D1329209}"/>
               </a:ext>
             </a:extLst>
           </p:cNvPr>
@@ -3759,18 +4270,522 @@
         <p:spPr/>
         <p:txBody>
           <a:bodyPr>
-            <a:normAutofit/>
+            <a:normAutofit fontScale="92500" lnSpcReduction="10000"/>
           </a:bodyPr>
           <a:lstStyle/>
           <a:p>
-            <a:endParaRPr lang="en-US" dirty="0"/>
+            <a:r>
+              <a:rPr lang="en-US" dirty="0"/>
+              <a:t>A synonymous mutation can be neutral in one environment, but contribute to selective pressure in another.</a:t>
+            </a:r>
+          </a:p>
+          <a:p>
+            <a:r>
+              <a:rPr lang="en-US" dirty="0"/>
+              <a:t>Positive and negative selection and random drift all occur continuously during virus evolution.</a:t>
+            </a:r>
+          </a:p>
+          <a:p>
+            <a:r>
+              <a:rPr lang="en-US" dirty="0"/>
+              <a:t>Short-term evolution is often reflected in the dominance of transition mutations, which is less apparent over long-term comparisons.</a:t>
+            </a:r>
+          </a:p>
+          <a:p>
+            <a:r>
+              <a:rPr lang="en-US" dirty="0"/>
+              <a:t>Omega can be used to measure how selection is occurring, but the authors don’t really like this measurement very much.</a:t>
+            </a:r>
+          </a:p>
+          <a:p>
+            <a:r>
+              <a:rPr lang="en-US" dirty="0"/>
+              <a:t>Mutation rate is not equivalent to observed frequency of mutations, because a commonly occurring mutation may be lethal, while an uncommon mutation may be beneficial for replication.</a:t>
+            </a:r>
           </a:p>
         </p:txBody>
       </p:sp>
     </p:spTree>
     <p:extLst>
       <p:ext uri="{BB962C8B-B14F-4D97-AF65-F5344CB8AC3E}">
-        <p14:creationId xmlns:p14="http://schemas.microsoft.com/office/powerpoint/2010/main" val="196150771"/>
+        <p14:creationId xmlns:p14="http://schemas.microsoft.com/office/powerpoint/2010/main" val="109970592"/>
+      </p:ext>
+    </p:extLst>
+  </p:cSld>
+  <p:clrMapOvr>
+    <a:masterClrMapping/>
+  </p:clrMapOvr>
+</p:sld>
+</file>
+
+<file path=ppt/slides/slide6.xml><?xml version="1.0" encoding="utf-8"?>
+<p:sld xmlns:a="http://schemas.openxmlformats.org/drawingml/2006/main" xmlns:r="http://schemas.openxmlformats.org/officeDocument/2006/relationships" xmlns:p="http://schemas.openxmlformats.org/presentationml/2006/main">
+  <p:cSld>
+    <p:spTree>
+      <p:nvGrpSpPr>
+        <p:cNvPr id="1" name=""/>
+        <p:cNvGrpSpPr/>
+        <p:nvPr/>
+      </p:nvGrpSpPr>
+      <p:grpSpPr>
+        <a:xfrm>
+          <a:off x="0" y="0"/>
+          <a:ext cx="0" cy="0"/>
+          <a:chOff x="0" y="0"/>
+          <a:chExt cx="0" cy="0"/>
+        </a:xfrm>
+      </p:grpSpPr>
+      <p:sp>
+        <p:nvSpPr>
+          <p:cNvPr id="2" name="Title 1">
+            <a:extLst>
+              <a:ext uri="{FF2B5EF4-FFF2-40B4-BE49-F238E27FC236}">
+                <a16:creationId xmlns:a16="http://schemas.microsoft.com/office/drawing/2014/main" id="{580E79A6-3DFB-11DF-14BD-976F1B3FF0D1}"/>
+              </a:ext>
+            </a:extLst>
+          </p:cNvPr>
+          <p:cNvSpPr>
+            <a:spLocks noGrp="1"/>
+          </p:cNvSpPr>
+          <p:nvPr>
+            <p:ph type="title"/>
+          </p:nvPr>
+        </p:nvSpPr>
+        <p:spPr/>
+        <p:txBody>
+          <a:bodyPr/>
+          <a:lstStyle/>
+          <a:p>
+            <a:r>
+              <a:rPr lang="en-US" dirty="0"/>
+              <a:t>Key Findings/Recommendations</a:t>
+            </a:r>
+          </a:p>
+        </p:txBody>
+      </p:sp>
+      <p:sp>
+        <p:nvSpPr>
+          <p:cNvPr id="3" name="Content Placeholder 2">
+            <a:extLst>
+              <a:ext uri="{FF2B5EF4-FFF2-40B4-BE49-F238E27FC236}">
+                <a16:creationId xmlns:a16="http://schemas.microsoft.com/office/drawing/2014/main" id="{55187FB3-B855-33E6-8E0A-0B97D1329209}"/>
+              </a:ext>
+            </a:extLst>
+          </p:cNvPr>
+          <p:cNvSpPr>
+            <a:spLocks noGrp="1"/>
+          </p:cNvSpPr>
+          <p:nvPr>
+            <p:ph idx="1"/>
+          </p:nvPr>
+        </p:nvSpPr>
+        <p:spPr/>
+        <p:txBody>
+          <a:bodyPr>
+            <a:normAutofit lnSpcReduction="10000"/>
+          </a:bodyPr>
+          <a:lstStyle/>
+          <a:p>
+            <a:r>
+              <a:rPr lang="en-US" dirty="0"/>
+              <a:t>Bottleneck selection events tend to be worse at eliminating unfit genomes than selection among a large, heavily competitive population.</a:t>
+            </a:r>
+          </a:p>
+          <a:p>
+            <a:r>
+              <a:rPr lang="en-US" dirty="0"/>
+              <a:t>Mutation rates in cells and viruses depend on the replicative machinery and on multiple environmental parameters.</a:t>
+            </a:r>
+          </a:p>
+          <a:p>
+            <a:r>
+              <a:rPr lang="en-US" dirty="0"/>
+              <a:t>Genome size imposes constraints on copying fidelity and genetic heterogeneity, but there is no clear overall winner.</a:t>
+            </a:r>
+          </a:p>
+          <a:p>
+            <a:r>
+              <a:rPr lang="en-US" dirty="0"/>
+              <a:t>It is unclear what selective constraints led to high mutation rates, but one suggestion is that there is a trade off between replication rate and copying fidelity. Some modified viruses with high fidelity have strong selective </a:t>
+            </a:r>
+            <a:r>
+              <a:rPr lang="en-US" dirty="0" err="1"/>
+              <a:t>disadvantanges</a:t>
+            </a:r>
+            <a:r>
+              <a:rPr lang="en-US" dirty="0"/>
+              <a:t> in the lab.</a:t>
+            </a:r>
+          </a:p>
+          <a:p>
+            <a:endParaRPr lang="en-US" dirty="0"/>
+          </a:p>
+        </p:txBody>
+      </p:sp>
+    </p:spTree>
+    <p:extLst>
+      <p:ext uri="{BB962C8B-B14F-4D97-AF65-F5344CB8AC3E}">
+        <p14:creationId xmlns:p14="http://schemas.microsoft.com/office/powerpoint/2010/main" val="2115596345"/>
+      </p:ext>
+    </p:extLst>
+  </p:cSld>
+  <p:clrMapOvr>
+    <a:masterClrMapping/>
+  </p:clrMapOvr>
+</p:sld>
+</file>
+
+<file path=ppt/slides/slide7.xml><?xml version="1.0" encoding="utf-8"?>
+<p:sld xmlns:a="http://schemas.openxmlformats.org/drawingml/2006/main" xmlns:r="http://schemas.openxmlformats.org/officeDocument/2006/relationships" xmlns:p="http://schemas.openxmlformats.org/presentationml/2006/main">
+  <p:cSld>
+    <p:spTree>
+      <p:nvGrpSpPr>
+        <p:cNvPr id="1" name=""/>
+        <p:cNvGrpSpPr/>
+        <p:nvPr/>
+      </p:nvGrpSpPr>
+      <p:grpSpPr>
+        <a:xfrm>
+          <a:off x="0" y="0"/>
+          <a:ext cx="0" cy="0"/>
+          <a:chOff x="0" y="0"/>
+          <a:chExt cx="0" cy="0"/>
+        </a:xfrm>
+      </p:grpSpPr>
+      <p:sp>
+        <p:nvSpPr>
+          <p:cNvPr id="2" name="Title 1">
+            <a:extLst>
+              <a:ext uri="{FF2B5EF4-FFF2-40B4-BE49-F238E27FC236}">
+                <a16:creationId xmlns:a16="http://schemas.microsoft.com/office/drawing/2014/main" id="{580E79A6-3DFB-11DF-14BD-976F1B3FF0D1}"/>
+              </a:ext>
+            </a:extLst>
+          </p:cNvPr>
+          <p:cNvSpPr>
+            <a:spLocks noGrp="1"/>
+          </p:cNvSpPr>
+          <p:nvPr>
+            <p:ph type="title"/>
+          </p:nvPr>
+        </p:nvSpPr>
+        <p:spPr/>
+        <p:txBody>
+          <a:bodyPr/>
+          <a:lstStyle/>
+          <a:p>
+            <a:r>
+              <a:rPr lang="en-US" dirty="0"/>
+              <a:t>Key Findings/Recommendations</a:t>
+            </a:r>
+          </a:p>
+        </p:txBody>
+      </p:sp>
+      <p:sp>
+        <p:nvSpPr>
+          <p:cNvPr id="3" name="Content Placeholder 2">
+            <a:extLst>
+              <a:ext uri="{FF2B5EF4-FFF2-40B4-BE49-F238E27FC236}">
+                <a16:creationId xmlns:a16="http://schemas.microsoft.com/office/drawing/2014/main" id="{55187FB3-B855-33E6-8E0A-0B97D1329209}"/>
+              </a:ext>
+            </a:extLst>
+          </p:cNvPr>
+          <p:cNvSpPr>
+            <a:spLocks noGrp="1"/>
+          </p:cNvSpPr>
+          <p:nvPr>
+            <p:ph idx="1"/>
+          </p:nvPr>
+        </p:nvSpPr>
+        <p:spPr/>
+        <p:txBody>
+          <a:bodyPr>
+            <a:normAutofit lnSpcReduction="10000"/>
+          </a:bodyPr>
+          <a:lstStyle/>
+          <a:p>
+            <a:r>
+              <a:rPr lang="en-US" dirty="0"/>
+              <a:t>The known </a:t>
+            </a:r>
+            <a:r>
+              <a:rPr lang="en-US" dirty="0" err="1"/>
+              <a:t>postreplicative</a:t>
+            </a:r>
+            <a:r>
+              <a:rPr lang="en-US" dirty="0"/>
+              <a:t> repair systems that operate in cellular DNA do not make a significant contribution to error correction in RNA viruses.</a:t>
+            </a:r>
+          </a:p>
+          <a:p>
+            <a:r>
+              <a:rPr lang="en-US" dirty="0"/>
+              <a:t>APOBEC and ADAR activity can lead to </a:t>
+            </a:r>
+            <a:r>
+              <a:rPr lang="en-US" dirty="0" err="1"/>
+              <a:t>hypermutagenesis</a:t>
+            </a:r>
+            <a:r>
+              <a:rPr lang="en-US" dirty="0"/>
+              <a:t> in viruses.</a:t>
+            </a:r>
+          </a:p>
+          <a:p>
+            <a:r>
+              <a:rPr lang="en-US" dirty="0"/>
+              <a:t>Higher than average mutation frequency can occur when nucleotide concentrations are biased in the host environment.</a:t>
+            </a:r>
+          </a:p>
+          <a:p>
+            <a:r>
+              <a:rPr lang="en-US" dirty="0"/>
+              <a:t>Codons which are one residue apart often revert mutations in subsequent generations, so engineering non-</a:t>
+            </a:r>
+            <a:r>
+              <a:rPr lang="en-US" dirty="0" err="1"/>
+              <a:t>revertable</a:t>
+            </a:r>
+            <a:r>
+              <a:rPr lang="en-US" dirty="0"/>
+              <a:t> codon mutations is potentially useful for inhibiting virus activity.</a:t>
+            </a:r>
+          </a:p>
+          <a:p>
+            <a:r>
+              <a:rPr lang="en-US" dirty="0"/>
+              <a:t>Deletions revert at a much lower rate than point mutations.</a:t>
+            </a:r>
+          </a:p>
+        </p:txBody>
+      </p:sp>
+    </p:spTree>
+    <p:extLst>
+      <p:ext uri="{BB962C8B-B14F-4D97-AF65-F5344CB8AC3E}">
+        <p14:creationId xmlns:p14="http://schemas.microsoft.com/office/powerpoint/2010/main" val="2379227504"/>
+      </p:ext>
+    </p:extLst>
+  </p:cSld>
+  <p:clrMapOvr>
+    <a:masterClrMapping/>
+  </p:clrMapOvr>
+</p:sld>
+</file>
+
+<file path=ppt/slides/slide8.xml><?xml version="1.0" encoding="utf-8"?>
+<p:sld xmlns:a="http://schemas.openxmlformats.org/drawingml/2006/main" xmlns:r="http://schemas.openxmlformats.org/officeDocument/2006/relationships" xmlns:p="http://schemas.openxmlformats.org/presentationml/2006/main">
+  <p:cSld>
+    <p:spTree>
+      <p:nvGrpSpPr>
+        <p:cNvPr id="1" name=""/>
+        <p:cNvGrpSpPr/>
+        <p:nvPr/>
+      </p:nvGrpSpPr>
+      <p:grpSpPr>
+        <a:xfrm>
+          <a:off x="0" y="0"/>
+          <a:ext cx="0" cy="0"/>
+          <a:chOff x="0" y="0"/>
+          <a:chExt cx="0" cy="0"/>
+        </a:xfrm>
+      </p:grpSpPr>
+      <p:sp>
+        <p:nvSpPr>
+          <p:cNvPr id="2" name="Title 1">
+            <a:extLst>
+              <a:ext uri="{FF2B5EF4-FFF2-40B4-BE49-F238E27FC236}">
+                <a16:creationId xmlns:a16="http://schemas.microsoft.com/office/drawing/2014/main" id="{580E79A6-3DFB-11DF-14BD-976F1B3FF0D1}"/>
+              </a:ext>
+            </a:extLst>
+          </p:cNvPr>
+          <p:cNvSpPr>
+            <a:spLocks noGrp="1"/>
+          </p:cNvSpPr>
+          <p:nvPr>
+            <p:ph type="title"/>
+          </p:nvPr>
+        </p:nvSpPr>
+        <p:spPr/>
+        <p:txBody>
+          <a:bodyPr/>
+          <a:lstStyle/>
+          <a:p>
+            <a:r>
+              <a:rPr lang="en-US" dirty="0"/>
+              <a:t>Key Findings/Recommendations</a:t>
+            </a:r>
+          </a:p>
+        </p:txBody>
+      </p:sp>
+      <p:sp>
+        <p:nvSpPr>
+          <p:cNvPr id="3" name="Content Placeholder 2">
+            <a:extLst>
+              <a:ext uri="{FF2B5EF4-FFF2-40B4-BE49-F238E27FC236}">
+                <a16:creationId xmlns:a16="http://schemas.microsoft.com/office/drawing/2014/main" id="{55187FB3-B855-33E6-8E0A-0B97D1329209}"/>
+              </a:ext>
+            </a:extLst>
+          </p:cNvPr>
+          <p:cNvSpPr>
+            <a:spLocks noGrp="1"/>
+          </p:cNvSpPr>
+          <p:nvPr>
+            <p:ph idx="1"/>
+          </p:nvPr>
+        </p:nvSpPr>
+        <p:spPr/>
+        <p:txBody>
+          <a:bodyPr>
+            <a:normAutofit fontScale="92500" lnSpcReduction="20000"/>
+          </a:bodyPr>
+          <a:lstStyle/>
+          <a:p>
+            <a:r>
+              <a:rPr lang="en-US" dirty="0"/>
+              <a:t>Copy-choice recombination and reassortment recombination both play an important role in the development of viral diversity, and the frequency of recombination can be altered by environmental factors.</a:t>
+            </a:r>
+          </a:p>
+          <a:p>
+            <a:r>
+              <a:rPr lang="en-US" dirty="0"/>
+              <a:t>Processivity of the viral polymerase is a major factor in determining the rate of recombination.</a:t>
+            </a:r>
+          </a:p>
+          <a:p>
+            <a:r>
+              <a:rPr lang="en-US" dirty="0"/>
+              <a:t>Neither unsegmented nor segmented genomes are universally “better” and can evolve in different conditions in the lab.</a:t>
+            </a:r>
+          </a:p>
+          <a:p>
+            <a:r>
+              <a:rPr lang="en-US" dirty="0"/>
+              <a:t>Despite how common recombination seems to be, it is not necessary, and we need to distinguish between mechanistically unavoidable and biologically useful recombination.</a:t>
+            </a:r>
+          </a:p>
+          <a:p>
+            <a:r>
+              <a:rPr lang="en-US" dirty="0"/>
+              <a:t>Viral diversity provides a compromise between the stability of core information transfer and flexibility to adapt.</a:t>
+            </a:r>
+          </a:p>
+        </p:txBody>
+      </p:sp>
+    </p:spTree>
+    <p:extLst>
+      <p:ext uri="{BB962C8B-B14F-4D97-AF65-F5344CB8AC3E}">
+        <p14:creationId xmlns:p14="http://schemas.microsoft.com/office/powerpoint/2010/main" val="3288447129"/>
+      </p:ext>
+    </p:extLst>
+  </p:cSld>
+  <p:clrMapOvr>
+    <a:masterClrMapping/>
+  </p:clrMapOvr>
+</p:sld>
+</file>
+
+<file path=ppt/slides/slide9.xml><?xml version="1.0" encoding="utf-8"?>
+<p:sld xmlns:a="http://schemas.openxmlformats.org/drawingml/2006/main" xmlns:r="http://schemas.openxmlformats.org/officeDocument/2006/relationships" xmlns:p="http://schemas.openxmlformats.org/presentationml/2006/main">
+  <p:cSld>
+    <p:spTree>
+      <p:nvGrpSpPr>
+        <p:cNvPr id="1" name=""/>
+        <p:cNvGrpSpPr/>
+        <p:nvPr/>
+      </p:nvGrpSpPr>
+      <p:grpSpPr>
+        <a:xfrm>
+          <a:off x="0" y="0"/>
+          <a:ext cx="0" cy="0"/>
+          <a:chOff x="0" y="0"/>
+          <a:chExt cx="0" cy="0"/>
+        </a:xfrm>
+      </p:grpSpPr>
+      <p:sp>
+        <p:nvSpPr>
+          <p:cNvPr id="2" name="Title 1">
+            <a:extLst>
+              <a:ext uri="{FF2B5EF4-FFF2-40B4-BE49-F238E27FC236}">
+                <a16:creationId xmlns:a16="http://schemas.microsoft.com/office/drawing/2014/main" id="{BA7B9142-092A-EBE2-510D-57BE0819B9A8}"/>
+              </a:ext>
+            </a:extLst>
+          </p:cNvPr>
+          <p:cNvSpPr>
+            <a:spLocks noGrp="1"/>
+          </p:cNvSpPr>
+          <p:nvPr>
+            <p:ph type="title"/>
+          </p:nvPr>
+        </p:nvSpPr>
+        <p:spPr/>
+        <p:txBody>
+          <a:bodyPr/>
+          <a:lstStyle/>
+          <a:p>
+            <a:r>
+              <a:rPr lang="en-US" dirty="0"/>
+              <a:t>Questions</a:t>
+            </a:r>
+          </a:p>
+        </p:txBody>
+      </p:sp>
+      <p:sp>
+        <p:nvSpPr>
+          <p:cNvPr id="3" name="Content Placeholder 2">
+            <a:extLst>
+              <a:ext uri="{FF2B5EF4-FFF2-40B4-BE49-F238E27FC236}">
+                <a16:creationId xmlns:a16="http://schemas.microsoft.com/office/drawing/2014/main" id="{3E05A46C-995E-49C3-968F-699FBF3D423F}"/>
+              </a:ext>
+            </a:extLst>
+          </p:cNvPr>
+          <p:cNvSpPr>
+            <a:spLocks noGrp="1"/>
+          </p:cNvSpPr>
+          <p:nvPr>
+            <p:ph idx="1"/>
+          </p:nvPr>
+        </p:nvSpPr>
+        <p:spPr/>
+        <p:txBody>
+          <a:bodyPr>
+            <a:normAutofit lnSpcReduction="10000"/>
+          </a:bodyPr>
+          <a:lstStyle/>
+          <a:p>
+            <a:r>
+              <a:rPr lang="en-US" dirty="0"/>
+              <a:t>Does high error rate of polymerase limit the complexity of a viral genome?</a:t>
+            </a:r>
+          </a:p>
+          <a:p>
+            <a:r>
+              <a:rPr lang="en-US" dirty="0"/>
+              <a:t>What is going on in Figure 2.5?</a:t>
+            </a:r>
+          </a:p>
+          <a:p>
+            <a:r>
+              <a:rPr lang="en-US" dirty="0"/>
+              <a:t>How can/do host cells evolve in conjunction with viruses to, e.g., selectively favor different tRNA concentrations or other host environment factors to limit viral replication?</a:t>
+            </a:r>
+          </a:p>
+          <a:p>
+            <a:r>
+              <a:rPr lang="en-US" dirty="0"/>
+              <a:t>How important are defective interfering subpopulations in the context of epidemiology?</a:t>
+            </a:r>
+          </a:p>
+          <a:p>
+            <a:r>
+              <a:rPr lang="en-US" dirty="0"/>
+              <a:t>What conditions drive the evolution of segmented genomes? What about highly complex or highly sparse genomes?</a:t>
+            </a:r>
+          </a:p>
+        </p:txBody>
+      </p:sp>
+    </p:spTree>
+    <p:extLst>
+      <p:ext uri="{BB962C8B-B14F-4D97-AF65-F5344CB8AC3E}">
+        <p14:creationId xmlns:p14="http://schemas.microsoft.com/office/powerpoint/2010/main" val="3438904725"/>
       </p:ext>
     </p:extLst>
   </p:cSld>

</xml_diff>